<commit_message>
+ Tidying and operationalising code
</commit_message>
<xml_diff>
--- a/outputs_figures/ms_figures/SI_results/figS1_life_stage_decision_tree.pptx
+++ b/outputs_figures/ms_figures/SI_results/figS1_life_stage_decision_tree.pptx
@@ -197,7 +197,7 @@
           <a:p>
             <a:fld id="{20D27AE7-0A5D-B94D-B638-F42A6E668559}" type="datetimeFigureOut">
               <a:rPr lang="en-US" smtClean="0"/>
-              <a:t>8/29/22</a:t>
+              <a:t>8/30/22</a:t>
             </a:fld>
             <a:endParaRPr lang="en-US"/>
           </a:p>
@@ -679,7 +679,7 @@
           <a:p>
             <a:fld id="{330526CD-C00A-094D-8031-75A621122F64}" type="datetimeFigureOut">
               <a:rPr lang="en-US" smtClean="0"/>
-              <a:t>8/29/22</a:t>
+              <a:t>8/30/22</a:t>
             </a:fld>
             <a:endParaRPr lang="en-US"/>
           </a:p>
@@ -849,7 +849,7 @@
           <a:p>
             <a:fld id="{330526CD-C00A-094D-8031-75A621122F64}" type="datetimeFigureOut">
               <a:rPr lang="en-US" smtClean="0"/>
-              <a:t>8/29/22</a:t>
+              <a:t>8/30/22</a:t>
             </a:fld>
             <a:endParaRPr lang="en-US"/>
           </a:p>
@@ -1029,7 +1029,7 @@
           <a:p>
             <a:fld id="{330526CD-C00A-094D-8031-75A621122F64}" type="datetimeFigureOut">
               <a:rPr lang="en-US" smtClean="0"/>
-              <a:t>8/29/22</a:t>
+              <a:t>8/30/22</a:t>
             </a:fld>
             <a:endParaRPr lang="en-US"/>
           </a:p>
@@ -1199,7 +1199,7 @@
           <a:p>
             <a:fld id="{330526CD-C00A-094D-8031-75A621122F64}" type="datetimeFigureOut">
               <a:rPr lang="en-US" smtClean="0"/>
-              <a:t>8/29/22</a:t>
+              <a:t>8/30/22</a:t>
             </a:fld>
             <a:endParaRPr lang="en-US"/>
           </a:p>
@@ -1443,7 +1443,7 @@
           <a:p>
             <a:fld id="{330526CD-C00A-094D-8031-75A621122F64}" type="datetimeFigureOut">
               <a:rPr lang="en-US" smtClean="0"/>
-              <a:t>8/29/22</a:t>
+              <a:t>8/30/22</a:t>
             </a:fld>
             <a:endParaRPr lang="en-US"/>
           </a:p>
@@ -1675,7 +1675,7 @@
           <a:p>
             <a:fld id="{330526CD-C00A-094D-8031-75A621122F64}" type="datetimeFigureOut">
               <a:rPr lang="en-US" smtClean="0"/>
-              <a:t>8/29/22</a:t>
+              <a:t>8/30/22</a:t>
             </a:fld>
             <a:endParaRPr lang="en-US"/>
           </a:p>
@@ -2042,7 +2042,7 @@
           <a:p>
             <a:fld id="{330526CD-C00A-094D-8031-75A621122F64}" type="datetimeFigureOut">
               <a:rPr lang="en-US" smtClean="0"/>
-              <a:t>8/29/22</a:t>
+              <a:t>8/30/22</a:t>
             </a:fld>
             <a:endParaRPr lang="en-US"/>
           </a:p>
@@ -2160,7 +2160,7 @@
           <a:p>
             <a:fld id="{330526CD-C00A-094D-8031-75A621122F64}" type="datetimeFigureOut">
               <a:rPr lang="en-US" smtClean="0"/>
-              <a:t>8/29/22</a:t>
+              <a:t>8/30/22</a:t>
             </a:fld>
             <a:endParaRPr lang="en-US"/>
           </a:p>
@@ -2255,7 +2255,7 @@
           <a:p>
             <a:fld id="{330526CD-C00A-094D-8031-75A621122F64}" type="datetimeFigureOut">
               <a:rPr lang="en-US" smtClean="0"/>
-              <a:t>8/29/22</a:t>
+              <a:t>8/30/22</a:t>
             </a:fld>
             <a:endParaRPr lang="en-US"/>
           </a:p>
@@ -2532,7 +2532,7 @@
           <a:p>
             <a:fld id="{330526CD-C00A-094D-8031-75A621122F64}" type="datetimeFigureOut">
               <a:rPr lang="en-US" smtClean="0"/>
-              <a:t>8/29/22</a:t>
+              <a:t>8/30/22</a:t>
             </a:fld>
             <a:endParaRPr lang="en-US"/>
           </a:p>
@@ -2789,7 +2789,7 @@
           <a:p>
             <a:fld id="{330526CD-C00A-094D-8031-75A621122F64}" type="datetimeFigureOut">
               <a:rPr lang="en-US" smtClean="0"/>
-              <a:t>8/29/22</a:t>
+              <a:t>8/30/22</a:t>
             </a:fld>
             <a:endParaRPr lang="en-US"/>
           </a:p>
@@ -3002,7 +3002,7 @@
           <a:p>
             <a:fld id="{330526CD-C00A-094D-8031-75A621122F64}" type="datetimeFigureOut">
               <a:rPr lang="en-US" smtClean="0"/>
-              <a:t>8/29/22</a:t>
+              <a:t>8/30/22</a:t>
             </a:fld>
             <a:endParaRPr lang="en-US"/>
           </a:p>
@@ -3642,7 +3642,7 @@
           <a:p>
             <a:r>
               <a:rPr lang="en-US" dirty="0"/>
-              <a:t>Yes (6% data)</a:t>
+              <a:t>Yes (5% data)</a:t>
             </a:r>
           </a:p>
         </p:txBody>
@@ -3681,7 +3681,7 @@
           <a:p>
             <a:r>
               <a:rPr lang="en-US" dirty="0"/>
-              <a:t>No (71% data)</a:t>
+              <a:t>No (72% data)</a:t>
             </a:r>
           </a:p>
         </p:txBody>
@@ -4333,7 +4333,15 @@
           <a:p>
             <a:r>
               <a:rPr lang="en-US" dirty="0"/>
-              <a:t>No (30% data)</a:t>
+              <a:t>No </a:t>
+            </a:r>
+            <a:r>
+              <a:rPr lang="en-US"/>
+              <a:t>(31% </a:t>
+            </a:r>
+            <a:r>
+              <a:rPr lang="en-US" dirty="0"/>
+              <a:t>data)</a:t>
             </a:r>
           </a:p>
         </p:txBody>

</xml_diff>

<commit_message>
+ Updating figure S1
</commit_message>
<xml_diff>
--- a/outputs_figures/ms_figures/SI_results/figS1_life_stage_decision_tree.pptx
+++ b/outputs_figures/ms_figures/SI_results/figS1_life_stage_decision_tree.pptx
@@ -197,7 +197,7 @@
           <a:p>
             <a:fld id="{20D27AE7-0A5D-B94D-B638-F42A6E668559}" type="datetimeFigureOut">
               <a:rPr lang="en-US" smtClean="0"/>
-              <a:t>8/30/22</a:t>
+              <a:t>9/14/22</a:t>
             </a:fld>
             <a:endParaRPr lang="en-US"/>
           </a:p>
@@ -508,6 +508,16 @@
           <a:bodyPr/>
           <a:lstStyle/>
           <a:p>
+            <a:r>
+              <a:rPr lang="en-US" dirty="0"/>
+              <a:t>*If needed, we could add another section that asks “prey life stage obvious from traits of adult vs. juvenile?” if yes </a:t>
+            </a:r>
+            <a:r>
+              <a:rPr lang="en-US" dirty="0">
+                <a:sym typeface="Wingdings" pitchFamily="2" charset="2"/>
+              </a:rPr>
+              <a:t> Select life stage with most plausible traits to have been consumed by albacore, if no  use predator size info.</a:t>
+            </a:r>
             <a:endParaRPr lang="en-US" dirty="0"/>
           </a:p>
         </p:txBody>
@@ -679,7 +689,7 @@
           <a:p>
             <a:fld id="{330526CD-C00A-094D-8031-75A621122F64}" type="datetimeFigureOut">
               <a:rPr lang="en-US" smtClean="0"/>
-              <a:t>8/30/22</a:t>
+              <a:t>9/14/22</a:t>
             </a:fld>
             <a:endParaRPr lang="en-US"/>
           </a:p>
@@ -849,7 +859,7 @@
           <a:p>
             <a:fld id="{330526CD-C00A-094D-8031-75A621122F64}" type="datetimeFigureOut">
               <a:rPr lang="en-US" smtClean="0"/>
-              <a:t>8/30/22</a:t>
+              <a:t>9/14/22</a:t>
             </a:fld>
             <a:endParaRPr lang="en-US"/>
           </a:p>
@@ -1029,7 +1039,7 @@
           <a:p>
             <a:fld id="{330526CD-C00A-094D-8031-75A621122F64}" type="datetimeFigureOut">
               <a:rPr lang="en-US" smtClean="0"/>
-              <a:t>8/30/22</a:t>
+              <a:t>9/14/22</a:t>
             </a:fld>
             <a:endParaRPr lang="en-US"/>
           </a:p>
@@ -1199,7 +1209,7 @@
           <a:p>
             <a:fld id="{330526CD-C00A-094D-8031-75A621122F64}" type="datetimeFigureOut">
               <a:rPr lang="en-US" smtClean="0"/>
-              <a:t>8/30/22</a:t>
+              <a:t>9/14/22</a:t>
             </a:fld>
             <a:endParaRPr lang="en-US"/>
           </a:p>
@@ -1443,7 +1453,7 @@
           <a:p>
             <a:fld id="{330526CD-C00A-094D-8031-75A621122F64}" type="datetimeFigureOut">
               <a:rPr lang="en-US" smtClean="0"/>
-              <a:t>8/30/22</a:t>
+              <a:t>9/14/22</a:t>
             </a:fld>
             <a:endParaRPr lang="en-US"/>
           </a:p>
@@ -1675,7 +1685,7 @@
           <a:p>
             <a:fld id="{330526CD-C00A-094D-8031-75A621122F64}" type="datetimeFigureOut">
               <a:rPr lang="en-US" smtClean="0"/>
-              <a:t>8/30/22</a:t>
+              <a:t>9/14/22</a:t>
             </a:fld>
             <a:endParaRPr lang="en-US"/>
           </a:p>
@@ -2042,7 +2052,7 @@
           <a:p>
             <a:fld id="{330526CD-C00A-094D-8031-75A621122F64}" type="datetimeFigureOut">
               <a:rPr lang="en-US" smtClean="0"/>
-              <a:t>8/30/22</a:t>
+              <a:t>9/14/22</a:t>
             </a:fld>
             <a:endParaRPr lang="en-US"/>
           </a:p>
@@ -2160,7 +2170,7 @@
           <a:p>
             <a:fld id="{330526CD-C00A-094D-8031-75A621122F64}" type="datetimeFigureOut">
               <a:rPr lang="en-US" smtClean="0"/>
-              <a:t>8/30/22</a:t>
+              <a:t>9/14/22</a:t>
             </a:fld>
             <a:endParaRPr lang="en-US"/>
           </a:p>
@@ -2255,7 +2265,7 @@
           <a:p>
             <a:fld id="{330526CD-C00A-094D-8031-75A621122F64}" type="datetimeFigureOut">
               <a:rPr lang="en-US" smtClean="0"/>
-              <a:t>8/30/22</a:t>
+              <a:t>9/14/22</a:t>
             </a:fld>
             <a:endParaRPr lang="en-US"/>
           </a:p>
@@ -2532,7 +2542,7 @@
           <a:p>
             <a:fld id="{330526CD-C00A-094D-8031-75A621122F64}" type="datetimeFigureOut">
               <a:rPr lang="en-US" smtClean="0"/>
-              <a:t>8/30/22</a:t>
+              <a:t>9/14/22</a:t>
             </a:fld>
             <a:endParaRPr lang="en-US"/>
           </a:p>
@@ -2789,7 +2799,7 @@
           <a:p>
             <a:fld id="{330526CD-C00A-094D-8031-75A621122F64}" type="datetimeFigureOut">
               <a:rPr lang="en-US" smtClean="0"/>
-              <a:t>8/30/22</a:t>
+              <a:t>9/14/22</a:t>
             </a:fld>
             <a:endParaRPr lang="en-US"/>
           </a:p>
@@ -3002,7 +3012,7 @@
           <a:p>
             <a:fld id="{330526CD-C00A-094D-8031-75A621122F64}" type="datetimeFigureOut">
               <a:rPr lang="en-US" smtClean="0"/>
-              <a:t>8/30/22</a:t>
+              <a:t>9/14/22</a:t>
             </a:fld>
             <a:endParaRPr lang="en-US"/>
           </a:p>
@@ -3700,7 +3710,7 @@
         </p:nvSpPr>
         <p:spPr>
           <a:xfrm>
-            <a:off x="137984" y="6424150"/>
+            <a:off x="137984" y="6354700"/>
             <a:ext cx="6639151" cy="369332"/>
           </a:xfrm>
           <a:prstGeom prst="rect">
@@ -3741,7 +3751,7 @@
         </p:nvSpPr>
         <p:spPr>
           <a:xfrm>
-            <a:off x="797501" y="6852857"/>
+            <a:off x="797501" y="6794982"/>
             <a:ext cx="1879600" cy="369332"/>
           </a:xfrm>
           <a:prstGeom prst="rect">
@@ -3787,7 +3797,7 @@
         </p:nvSpPr>
         <p:spPr>
           <a:xfrm>
-            <a:off x="3904584" y="6854712"/>
+            <a:off x="3904584" y="6796837"/>
             <a:ext cx="1536700" cy="369332"/>
           </a:xfrm>
           <a:prstGeom prst="rect">
@@ -3826,7 +3836,7 @@
         </p:nvSpPr>
         <p:spPr>
           <a:xfrm>
-            <a:off x="3119540" y="7850550"/>
+            <a:off x="3119540" y="7792675"/>
             <a:ext cx="3657598" cy="923330"/>
           </a:xfrm>
           <a:prstGeom prst="rect">
@@ -3867,7 +3877,7 @@
         </p:nvSpPr>
         <p:spPr>
           <a:xfrm>
-            <a:off x="137986" y="10473094"/>
+            <a:off x="137986" y="10368919"/>
             <a:ext cx="6655845" cy="646331"/>
           </a:xfrm>
           <a:prstGeom prst="rect">
@@ -3876,6 +3886,7 @@
           <a:solidFill>
             <a:schemeClr val="accent4">
               <a:lumMod val="75000"/>
+              <a:alpha val="85000"/>
             </a:schemeClr>
           </a:solidFill>
         </p:spPr>
@@ -3907,8 +3918,8 @@
         </p:nvSpPr>
         <p:spPr>
           <a:xfrm>
-            <a:off x="121294" y="11243749"/>
-            <a:ext cx="6655844" cy="369332"/>
+            <a:off x="137987" y="11079570"/>
+            <a:ext cx="6655844" cy="646331"/>
           </a:xfrm>
           <a:prstGeom prst="rect">
             <a:avLst/>
@@ -3916,6 +3927,7 @@
           <a:solidFill>
             <a:schemeClr val="accent4">
               <a:lumMod val="75000"/>
+              <a:alpha val="85000"/>
             </a:schemeClr>
           </a:solidFill>
         </p:spPr>
@@ -3928,7 +3940,7 @@
             <a:pPr algn="ctr"/>
             <a:r>
               <a:rPr lang="en-US" dirty="0"/>
-              <a:t>Infer prey size consumed and life stage from estimated gape limit</a:t>
+              <a:t>Infer prey size consumed and life stage from estimated gape limit &amp; case-by-case assessment of most plausible trait information</a:t>
             </a:r>
           </a:p>
         </p:txBody>
@@ -3947,7 +3959,7 @@
         </p:nvSpPr>
         <p:spPr>
           <a:xfrm>
-            <a:off x="137986" y="7850550"/>
+            <a:off x="137986" y="7792675"/>
             <a:ext cx="2511024" cy="923330"/>
           </a:xfrm>
           <a:prstGeom prst="rect">
@@ -3991,7 +4003,7 @@
         </p:nvSpPr>
         <p:spPr>
           <a:xfrm>
-            <a:off x="137986" y="11758622"/>
+            <a:off x="137986" y="11781772"/>
             <a:ext cx="6639152" cy="369332"/>
           </a:xfrm>
           <a:prstGeom prst="rect">
@@ -4000,6 +4012,7 @@
           <a:solidFill>
             <a:schemeClr val="accent4">
               <a:lumMod val="75000"/>
+              <a:alpha val="85000"/>
             </a:schemeClr>
           </a:solidFill>
         </p:spPr>
@@ -4097,7 +4110,7 @@
         </p:nvSpPr>
         <p:spPr>
           <a:xfrm>
-            <a:off x="137987" y="3545358"/>
+            <a:off x="137987" y="3475908"/>
             <a:ext cx="2511023" cy="646331"/>
           </a:xfrm>
           <a:prstGeom prst="rect">
@@ -4141,7 +4154,7 @@
         </p:nvSpPr>
         <p:spPr>
           <a:xfrm rot="17630561">
-            <a:off x="2765644" y="8743156"/>
+            <a:off x="2765644" y="8696856"/>
             <a:ext cx="237262" cy="334822"/>
           </a:xfrm>
           <a:prstGeom prst="downArrow">
@@ -4187,7 +4200,7 @@
         </p:nvSpPr>
         <p:spPr>
           <a:xfrm rot="19894670">
-            <a:off x="1403974" y="8852719"/>
+            <a:off x="1403974" y="8748544"/>
             <a:ext cx="433884" cy="1394302"/>
           </a:xfrm>
           <a:prstGeom prst="downArrow">
@@ -4233,7 +4246,7 @@
         </p:nvSpPr>
         <p:spPr>
           <a:xfrm>
-            <a:off x="137984" y="4248703"/>
+            <a:off x="109424" y="4189872"/>
             <a:ext cx="6639151" cy="369332"/>
           </a:xfrm>
           <a:prstGeom prst="rect">
@@ -4255,7 +4268,7 @@
             <a:pPr algn="ctr"/>
             <a:r>
               <a:rPr lang="en-US" i="1" dirty="0"/>
-              <a:t>Prey trait is the same or different for across life stages?</a:t>
+              <a:t>Prey trait is the same across life stages?</a:t>
             </a:r>
           </a:p>
         </p:txBody>
@@ -4274,7 +4287,7 @@
         </p:nvSpPr>
         <p:spPr>
           <a:xfrm>
-            <a:off x="1098304" y="4703413"/>
+            <a:off x="1098304" y="4645538"/>
             <a:ext cx="1577160" cy="369332"/>
           </a:xfrm>
           <a:prstGeom prst="rect">
@@ -4313,7 +4326,7 @@
         </p:nvSpPr>
         <p:spPr>
           <a:xfrm>
-            <a:off x="3904584" y="4700867"/>
+            <a:off x="3904584" y="4642992"/>
             <a:ext cx="1536700" cy="369332"/>
           </a:xfrm>
           <a:prstGeom prst="rect">
@@ -4360,8 +4373,8 @@
         </p:nvSpPr>
         <p:spPr>
           <a:xfrm>
-            <a:off x="4500233" y="2960921"/>
-            <a:ext cx="448108" cy="1230767"/>
+            <a:off x="4500233" y="2960922"/>
+            <a:ext cx="448108" cy="1161318"/>
           </a:xfrm>
           <a:prstGeom prst="downArrow">
             <a:avLst/>
@@ -4406,7 +4419,7 @@
         </p:nvSpPr>
         <p:spPr>
           <a:xfrm rot="1857859">
-            <a:off x="1821418" y="2968872"/>
+            <a:off x="1821418" y="2945722"/>
             <a:ext cx="370926" cy="508824"/>
           </a:xfrm>
           <a:prstGeom prst="downArrow">
@@ -4440,10 +4453,54 @@
       </p:sp>
       <p:sp>
         <p:nvSpPr>
-          <p:cNvPr id="35" name="Down Arrow 34">
+          <p:cNvPr id="23" name="TextBox 22">
             <a:extLst>
               <a:ext uri="{FF2B5EF4-FFF2-40B4-BE49-F238E27FC236}">
-                <a16:creationId xmlns:a16="http://schemas.microsoft.com/office/drawing/2014/main" id="{D2D893E0-57FD-509B-D0D0-8A08A568F00C}"/>
+                <a16:creationId xmlns:a16="http://schemas.microsoft.com/office/drawing/2014/main" id="{7078BAF2-636D-A87B-0DF2-9ECB35E33956}"/>
+              </a:ext>
+            </a:extLst>
+          </p:cNvPr>
+          <p:cNvSpPr txBox="1"/>
+          <p:nvPr/>
+        </p:nvSpPr>
+        <p:spPr>
+          <a:xfrm>
+            <a:off x="433887" y="1372343"/>
+            <a:ext cx="2316217" cy="646331"/>
+          </a:xfrm>
+          <a:prstGeom prst="rect">
+            <a:avLst/>
+          </a:prstGeom>
+          <a:solidFill>
+            <a:schemeClr val="accent4">
+              <a:lumMod val="75000"/>
+              <a:alpha val="50000"/>
+            </a:schemeClr>
+          </a:solidFill>
+        </p:spPr>
+        <p:txBody>
+          <a:bodyPr wrap="square" rtlCol="0">
+            <a:spAutoFit/>
+          </a:bodyPr>
+          <a:lstStyle/>
+          <a:p>
+            <a:pPr algn="ctr"/>
+            <a:r>
+              <a:rPr lang="en-US" dirty="0">
+                <a:sym typeface="Wingdings" pitchFamily="2" charset="2"/>
+              </a:rPr>
+              <a:t>Use reported prey life stage</a:t>
+            </a:r>
+            <a:endParaRPr lang="en-US" dirty="0"/>
+          </a:p>
+        </p:txBody>
+      </p:sp>
+      <p:sp>
+        <p:nvSpPr>
+          <p:cNvPr id="24" name="Down Arrow 23">
+            <a:extLst>
+              <a:ext uri="{FF2B5EF4-FFF2-40B4-BE49-F238E27FC236}">
+                <a16:creationId xmlns:a16="http://schemas.microsoft.com/office/drawing/2014/main" id="{EFC9C128-4DDC-FEF3-337D-DD37090A8063}"/>
               </a:ext>
             </a:extLst>
           </p:cNvPr>
@@ -4451,9 +4508,9 @@
           <p:nvPr/>
         </p:nvSpPr>
         <p:spPr>
-          <a:xfrm>
-            <a:off x="4538823" y="5120189"/>
-            <a:ext cx="409517" cy="1265844"/>
+          <a:xfrm rot="1857859">
+            <a:off x="1821418" y="5080680"/>
+            <a:ext cx="370926" cy="508824"/>
           </a:xfrm>
           <a:prstGeom prst="downArrow">
             <a:avLst/>
@@ -4486,10 +4543,10 @@
       </p:sp>
       <p:sp>
         <p:nvSpPr>
-          <p:cNvPr id="23" name="TextBox 22">
+          <p:cNvPr id="37" name="TextBox 36">
             <a:extLst>
               <a:ext uri="{FF2B5EF4-FFF2-40B4-BE49-F238E27FC236}">
-                <a16:creationId xmlns:a16="http://schemas.microsoft.com/office/drawing/2014/main" id="{7078BAF2-636D-A87B-0DF2-9ECB35E33956}"/>
+                <a16:creationId xmlns:a16="http://schemas.microsoft.com/office/drawing/2014/main" id="{913956BF-26F2-C06E-E49C-79A1E3FCDA0A}"/>
               </a:ext>
             </a:extLst>
           </p:cNvPr>
@@ -4498,8 +4555,8 @@
         </p:nvSpPr>
         <p:spPr>
           <a:xfrm>
-            <a:off x="433887" y="1372343"/>
-            <a:ext cx="2316217" cy="646331"/>
+            <a:off x="139934" y="5610273"/>
+            <a:ext cx="2511023" cy="646331"/>
           </a:xfrm>
           <a:prstGeom prst="rect">
             <a:avLst/>
@@ -4522,7 +4579,7 @@
               <a:rPr lang="en-US" dirty="0">
                 <a:sym typeface="Wingdings" pitchFamily="2" charset="2"/>
               </a:rPr>
-              <a:t>Use reported prey life stage</a:t>
+              <a:t>No further life stage estimation required</a:t>
             </a:r>
             <a:endParaRPr lang="en-US" dirty="0"/>
           </a:p>
@@ -4530,10 +4587,10 @@
       </p:sp>
       <p:sp>
         <p:nvSpPr>
-          <p:cNvPr id="24" name="Down Arrow 23">
+          <p:cNvPr id="38" name="Down Arrow 37">
             <a:extLst>
               <a:ext uri="{FF2B5EF4-FFF2-40B4-BE49-F238E27FC236}">
-                <a16:creationId xmlns:a16="http://schemas.microsoft.com/office/drawing/2014/main" id="{EFC9C128-4DDC-FEF3-337D-DD37090A8063}"/>
+                <a16:creationId xmlns:a16="http://schemas.microsoft.com/office/drawing/2014/main" id="{C4B81D6B-44FF-33C9-4D5A-488B853A7FFA}"/>
               </a:ext>
             </a:extLst>
           </p:cNvPr>
@@ -4542,7 +4599,7 @@
         </p:nvSpPr>
         <p:spPr>
           <a:xfrm rot="1857859">
-            <a:off x="1821418" y="5173280"/>
+            <a:off x="1890796" y="7233489"/>
             <a:ext cx="370926" cy="508824"/>
           </a:xfrm>
           <a:prstGeom prst="downArrow">
@@ -4576,54 +4633,10 @@
       </p:sp>
       <p:sp>
         <p:nvSpPr>
-          <p:cNvPr id="37" name="TextBox 36">
+          <p:cNvPr id="39" name="Down Arrow 38">
             <a:extLst>
               <a:ext uri="{FF2B5EF4-FFF2-40B4-BE49-F238E27FC236}">
-                <a16:creationId xmlns:a16="http://schemas.microsoft.com/office/drawing/2014/main" id="{913956BF-26F2-C06E-E49C-79A1E3FCDA0A}"/>
-              </a:ext>
-            </a:extLst>
-          </p:cNvPr>
-          <p:cNvSpPr txBox="1"/>
-          <p:nvPr/>
-        </p:nvSpPr>
-        <p:spPr>
-          <a:xfrm>
-            <a:off x="139934" y="5702873"/>
-            <a:ext cx="2511023" cy="646331"/>
-          </a:xfrm>
-          <a:prstGeom prst="rect">
-            <a:avLst/>
-          </a:prstGeom>
-          <a:solidFill>
-            <a:schemeClr val="accent4">
-              <a:lumMod val="75000"/>
-              <a:alpha val="50000"/>
-            </a:schemeClr>
-          </a:solidFill>
-        </p:spPr>
-        <p:txBody>
-          <a:bodyPr wrap="square" rtlCol="0">
-            <a:spAutoFit/>
-          </a:bodyPr>
-          <a:lstStyle/>
-          <a:p>
-            <a:pPr algn="ctr"/>
-            <a:r>
-              <a:rPr lang="en-US" dirty="0">
-                <a:sym typeface="Wingdings" pitchFamily="2" charset="2"/>
-              </a:rPr>
-              <a:t>No further life stage estimation required</a:t>
-            </a:r>
-            <a:endParaRPr lang="en-US" dirty="0"/>
-          </a:p>
-        </p:txBody>
-      </p:sp>
-      <p:sp>
-        <p:nvSpPr>
-          <p:cNvPr id="38" name="Down Arrow 37">
-            <a:extLst>
-              <a:ext uri="{FF2B5EF4-FFF2-40B4-BE49-F238E27FC236}">
-                <a16:creationId xmlns:a16="http://schemas.microsoft.com/office/drawing/2014/main" id="{C4B81D6B-44FF-33C9-4D5A-488B853A7FFA}"/>
+                <a16:creationId xmlns:a16="http://schemas.microsoft.com/office/drawing/2014/main" id="{E1256B00-3828-E876-BAC9-BED01316CE6E}"/>
               </a:ext>
             </a:extLst>
           </p:cNvPr>
@@ -4631,9 +4644,9 @@
           <p:nvPr/>
         </p:nvSpPr>
         <p:spPr>
-          <a:xfrm rot="1857859">
-            <a:off x="1890796" y="7314514"/>
-            <a:ext cx="370926" cy="508824"/>
+          <a:xfrm>
+            <a:off x="4538822" y="7216023"/>
+            <a:ext cx="409517" cy="529801"/>
           </a:xfrm>
           <a:prstGeom prst="downArrow">
             <a:avLst/>
@@ -4666,10 +4679,51 @@
       </p:sp>
       <p:sp>
         <p:nvSpPr>
-          <p:cNvPr id="39" name="Down Arrow 38">
+          <p:cNvPr id="40" name="TextBox 39">
             <a:extLst>
               <a:ext uri="{FF2B5EF4-FFF2-40B4-BE49-F238E27FC236}">
-                <a16:creationId xmlns:a16="http://schemas.microsoft.com/office/drawing/2014/main" id="{E1256B00-3828-E876-BAC9-BED01316CE6E}"/>
+                <a16:creationId xmlns:a16="http://schemas.microsoft.com/office/drawing/2014/main" id="{6B1A5C79-D823-A436-5169-23F354A6C446}"/>
+              </a:ext>
+            </a:extLst>
+          </p:cNvPr>
+          <p:cNvSpPr txBox="1"/>
+          <p:nvPr/>
+        </p:nvSpPr>
+        <p:spPr>
+          <a:xfrm>
+            <a:off x="3119540" y="8806392"/>
+            <a:ext cx="3657598" cy="923330"/>
+          </a:xfrm>
+          <a:prstGeom prst="rect">
+            <a:avLst/>
+          </a:prstGeom>
+          <a:solidFill>
+            <a:schemeClr val="accent4">
+              <a:lumMod val="75000"/>
+              <a:alpha val="50000"/>
+            </a:schemeClr>
+          </a:solidFill>
+        </p:spPr>
+        <p:txBody>
+          <a:bodyPr wrap="square" rtlCol="0">
+            <a:spAutoFit/>
+          </a:bodyPr>
+          <a:lstStyle/>
+          <a:p>
+            <a:pPr algn="ctr"/>
+            <a:r>
+              <a:rPr lang="en-US" dirty="0"/>
+              <a:t>*9 of the studies that provided min / max FL, did not provide means, these were also estimated at this step.</a:t>
+            </a:r>
+          </a:p>
+        </p:txBody>
+      </p:sp>
+      <p:sp>
+        <p:nvSpPr>
+          <p:cNvPr id="41" name="Down Arrow 40">
+            <a:extLst>
+              <a:ext uri="{FF2B5EF4-FFF2-40B4-BE49-F238E27FC236}">
+                <a16:creationId xmlns:a16="http://schemas.microsoft.com/office/drawing/2014/main" id="{CEE899CF-BD12-FFC9-7DC3-A8253D99280F}"/>
               </a:ext>
             </a:extLst>
           </p:cNvPr>
@@ -4678,7 +4732,7 @@
         </p:nvSpPr>
         <p:spPr>
           <a:xfrm>
-            <a:off x="4538822" y="7273898"/>
+            <a:off x="4538821" y="9784420"/>
             <a:ext cx="409517" cy="529801"/>
           </a:xfrm>
           <a:prstGeom prst="downArrow">
@@ -4712,51 +4766,10 @@
       </p:sp>
       <p:sp>
         <p:nvSpPr>
-          <p:cNvPr id="40" name="TextBox 39">
+          <p:cNvPr id="20" name="Down Arrow 19">
             <a:extLst>
               <a:ext uri="{FF2B5EF4-FFF2-40B4-BE49-F238E27FC236}">
-                <a16:creationId xmlns:a16="http://schemas.microsoft.com/office/drawing/2014/main" id="{6B1A5C79-D823-A436-5169-23F354A6C446}"/>
-              </a:ext>
-            </a:extLst>
-          </p:cNvPr>
-          <p:cNvSpPr txBox="1"/>
-          <p:nvPr/>
-        </p:nvSpPr>
-        <p:spPr>
-          <a:xfrm>
-            <a:off x="3119540" y="8910567"/>
-            <a:ext cx="3657598" cy="923330"/>
-          </a:xfrm>
-          <a:prstGeom prst="rect">
-            <a:avLst/>
-          </a:prstGeom>
-          <a:solidFill>
-            <a:schemeClr val="accent4">
-              <a:lumMod val="75000"/>
-              <a:alpha val="50000"/>
-            </a:schemeClr>
-          </a:solidFill>
-        </p:spPr>
-        <p:txBody>
-          <a:bodyPr wrap="square" rtlCol="0">
-            <a:spAutoFit/>
-          </a:bodyPr>
-          <a:lstStyle/>
-          <a:p>
-            <a:pPr algn="ctr"/>
-            <a:r>
-              <a:rPr lang="en-US" dirty="0"/>
-              <a:t>*9 of the studies that provided min / max FL, did not provide means, these were also estimated at this step.</a:t>
-            </a:r>
-          </a:p>
-        </p:txBody>
-      </p:sp>
-      <p:sp>
-        <p:nvSpPr>
-          <p:cNvPr id="41" name="Down Arrow 40">
-            <a:extLst>
-              <a:ext uri="{FF2B5EF4-FFF2-40B4-BE49-F238E27FC236}">
-                <a16:creationId xmlns:a16="http://schemas.microsoft.com/office/drawing/2014/main" id="{CEE899CF-BD12-FFC9-7DC3-A8253D99280F}"/>
+                <a16:creationId xmlns:a16="http://schemas.microsoft.com/office/drawing/2014/main" id="{A073A17B-472A-C075-1BFD-1EAE310B2EEB}"/>
               </a:ext>
             </a:extLst>
           </p:cNvPr>
@@ -4765,8 +4778,8 @@
         </p:nvSpPr>
         <p:spPr>
           <a:xfrm>
-            <a:off x="4538821" y="9888595"/>
-            <a:ext cx="409517" cy="529801"/>
+            <a:off x="4538821" y="5044758"/>
+            <a:ext cx="448108" cy="1161318"/>
           </a:xfrm>
           <a:prstGeom prst="downArrow">
             <a:avLst/>

</xml_diff>

<commit_message>
+ Working on MS revision 1
</commit_message>
<xml_diff>
--- a/outputs_figures/ms_figures/SI_results/figS1_life_stage_decision_tree.pptx
+++ b/outputs_figures/ms_figures/SI_results/figS1_life_stage_decision_tree.pptx
@@ -197,7 +197,7 @@
           <a:p>
             <a:fld id="{20D27AE7-0A5D-B94D-B638-F42A6E668559}" type="datetimeFigureOut">
               <a:rPr lang="en-US" smtClean="0"/>
-              <a:t>9/14/22</a:t>
+              <a:t>5/7/23</a:t>
             </a:fld>
             <a:endParaRPr lang="en-US"/>
           </a:p>
@@ -689,7 +689,7 @@
           <a:p>
             <a:fld id="{330526CD-C00A-094D-8031-75A621122F64}" type="datetimeFigureOut">
               <a:rPr lang="en-US" smtClean="0"/>
-              <a:t>9/14/22</a:t>
+              <a:t>5/7/23</a:t>
             </a:fld>
             <a:endParaRPr lang="en-US"/>
           </a:p>
@@ -859,7 +859,7 @@
           <a:p>
             <a:fld id="{330526CD-C00A-094D-8031-75A621122F64}" type="datetimeFigureOut">
               <a:rPr lang="en-US" smtClean="0"/>
-              <a:t>9/14/22</a:t>
+              <a:t>5/7/23</a:t>
             </a:fld>
             <a:endParaRPr lang="en-US"/>
           </a:p>
@@ -1039,7 +1039,7 @@
           <a:p>
             <a:fld id="{330526CD-C00A-094D-8031-75A621122F64}" type="datetimeFigureOut">
               <a:rPr lang="en-US" smtClean="0"/>
-              <a:t>9/14/22</a:t>
+              <a:t>5/7/23</a:t>
             </a:fld>
             <a:endParaRPr lang="en-US"/>
           </a:p>
@@ -1209,7 +1209,7 @@
           <a:p>
             <a:fld id="{330526CD-C00A-094D-8031-75A621122F64}" type="datetimeFigureOut">
               <a:rPr lang="en-US" smtClean="0"/>
-              <a:t>9/14/22</a:t>
+              <a:t>5/7/23</a:t>
             </a:fld>
             <a:endParaRPr lang="en-US"/>
           </a:p>
@@ -1453,7 +1453,7 @@
           <a:p>
             <a:fld id="{330526CD-C00A-094D-8031-75A621122F64}" type="datetimeFigureOut">
               <a:rPr lang="en-US" smtClean="0"/>
-              <a:t>9/14/22</a:t>
+              <a:t>5/7/23</a:t>
             </a:fld>
             <a:endParaRPr lang="en-US"/>
           </a:p>
@@ -1685,7 +1685,7 @@
           <a:p>
             <a:fld id="{330526CD-C00A-094D-8031-75A621122F64}" type="datetimeFigureOut">
               <a:rPr lang="en-US" smtClean="0"/>
-              <a:t>9/14/22</a:t>
+              <a:t>5/7/23</a:t>
             </a:fld>
             <a:endParaRPr lang="en-US"/>
           </a:p>
@@ -2052,7 +2052,7 @@
           <a:p>
             <a:fld id="{330526CD-C00A-094D-8031-75A621122F64}" type="datetimeFigureOut">
               <a:rPr lang="en-US" smtClean="0"/>
-              <a:t>9/14/22</a:t>
+              <a:t>5/7/23</a:t>
             </a:fld>
             <a:endParaRPr lang="en-US"/>
           </a:p>
@@ -2170,7 +2170,7 @@
           <a:p>
             <a:fld id="{330526CD-C00A-094D-8031-75A621122F64}" type="datetimeFigureOut">
               <a:rPr lang="en-US" smtClean="0"/>
-              <a:t>9/14/22</a:t>
+              <a:t>5/7/23</a:t>
             </a:fld>
             <a:endParaRPr lang="en-US"/>
           </a:p>
@@ -2265,7 +2265,7 @@
           <a:p>
             <a:fld id="{330526CD-C00A-094D-8031-75A621122F64}" type="datetimeFigureOut">
               <a:rPr lang="en-US" smtClean="0"/>
-              <a:t>9/14/22</a:t>
+              <a:t>5/7/23</a:t>
             </a:fld>
             <a:endParaRPr lang="en-US"/>
           </a:p>
@@ -2542,7 +2542,7 @@
           <a:p>
             <a:fld id="{330526CD-C00A-094D-8031-75A621122F64}" type="datetimeFigureOut">
               <a:rPr lang="en-US" smtClean="0"/>
-              <a:t>9/14/22</a:t>
+              <a:t>5/7/23</a:t>
             </a:fld>
             <a:endParaRPr lang="en-US"/>
           </a:p>
@@ -2799,7 +2799,7 @@
           <a:p>
             <a:fld id="{330526CD-C00A-094D-8031-75A621122F64}" type="datetimeFigureOut">
               <a:rPr lang="en-US" smtClean="0"/>
-              <a:t>9/14/22</a:t>
+              <a:t>5/7/23</a:t>
             </a:fld>
             <a:endParaRPr lang="en-US"/>
           </a:p>
@@ -3012,7 +3012,7 @@
           <a:p>
             <a:fld id="{330526CD-C00A-094D-8031-75A621122F64}" type="datetimeFigureOut">
               <a:rPr lang="en-US" smtClean="0"/>
-              <a:t>9/14/22</a:t>
+              <a:t>5/7/23</a:t>
             </a:fld>
             <a:endParaRPr lang="en-US"/>
           </a:p>

</xml_diff>